<commit_message>
save work on presentation
</commit_message>
<xml_diff>
--- a/de.htwg.se.mastermind/Presentation.pptx
+++ b/de.htwg.se.mastermind/Presentation.pptx
@@ -5,7 +5,7 @@
     <p:sldMasterId id="2147483910" r:id="rId1"/>
   </p:sldMasterIdLst>
   <p:notesMasterIdLst>
-    <p:notesMasterId r:id="rId10"/>
+    <p:notesMasterId r:id="rId13"/>
   </p:notesMasterIdLst>
   <p:sldIdLst>
     <p:sldId id="256" r:id="rId2"/>
@@ -13,9 +13,12 @@
     <p:sldId id="258" r:id="rId4"/>
     <p:sldId id="260" r:id="rId5"/>
     <p:sldId id="261" r:id="rId6"/>
-    <p:sldId id="262" r:id="rId7"/>
-    <p:sldId id="263" r:id="rId8"/>
-    <p:sldId id="259" r:id="rId9"/>
+    <p:sldId id="263" r:id="rId7"/>
+    <p:sldId id="266" r:id="rId8"/>
+    <p:sldId id="265" r:id="rId9"/>
+    <p:sldId id="267" r:id="rId10"/>
+    <p:sldId id="268" r:id="rId11"/>
+    <p:sldId id="259" r:id="rId12"/>
   </p:sldIdLst>
   <p:sldSz cx="9144000" cy="6858000" type="screen4x3"/>
   <p:notesSz cx="6858000" cy="9144000"/>
@@ -116,7 +119,7 @@
   </p:defaultTextStyle>
   <p:extLst>
     <p:ext uri="{EFAFB233-063F-42B5-8137-9DF3F51BA10A}">
-      <p15:sldGuideLst xmlns:p15="http://schemas.microsoft.com/office/powerpoint/2012/main" xmlns=""/>
+      <p15:sldGuideLst xmlns="" xmlns:p15="http://schemas.microsoft.com/office/powerpoint/2012/main"/>
     </p:ext>
   </p:extLst>
 </p:presentation>
@@ -205,7 +208,7 @@
             <a:fld id="{F54E8837-5039-41ED-B9BC-F738B3360D64}" type="datetimeFigureOut">
               <a:rPr lang="de-DE"/>
               <a:pPr/>
-              <a:t>01.06.2015</a:t>
+              <a:t>10.06.2015</a:t>
             </a:fld>
             <a:endParaRPr lang="de-DE"/>
           </a:p>
@@ -373,7 +376,7 @@
     </p:spTree>
     <p:extLst>
       <p:ext uri="{BB962C8B-B14F-4D97-AF65-F5344CB8AC3E}">
-        <p14:creationId xmlns:p14="http://schemas.microsoft.com/office/powerpoint/2010/main" xmlns="" val="2518394835"/>
+        <p14:creationId xmlns="" xmlns:p14="http://schemas.microsoft.com/office/powerpoint/2010/main" val="2518394835"/>
       </p:ext>
     </p:extLst>
   </p:cSld>
@@ -553,7 +556,7 @@
     </p:spTree>
     <p:extLst>
       <p:ext uri="{BB962C8B-B14F-4D97-AF65-F5344CB8AC3E}">
-        <p14:creationId xmlns:p14="http://schemas.microsoft.com/office/powerpoint/2010/main" xmlns="" val="1482335734"/>
+        <p14:creationId xmlns="" xmlns:p14="http://schemas.microsoft.com/office/powerpoint/2010/main" val="1482335734"/>
       </p:ext>
     </p:extLst>
   </p:cSld>
@@ -789,7 +792,8 @@
           <a:p>
             <a:fld id="{0D4B5BC9-8E77-47C1-BB89-20F126E111F0}" type="datetime1">
               <a:rPr lang="de-DE" smtClean="0"/>
-              <a:t>01.06.2015</a:t>
+              <a:pPr/>
+              <a:t>10.06.2015</a:t>
             </a:fld>
             <a:endParaRPr lang="en-US" dirty="0"/>
           </a:p>
@@ -883,7 +887,7 @@
     </p:spTree>
     <p:extLst>
       <p:ext uri="{BB962C8B-B14F-4D97-AF65-F5344CB8AC3E}">
-        <p14:creationId xmlns:p14="http://schemas.microsoft.com/office/powerpoint/2010/main" xmlns="" val="1403014083"/>
+        <p14:creationId xmlns="" xmlns:p14="http://schemas.microsoft.com/office/powerpoint/2010/main" val="1403014083"/>
       </p:ext>
     </p:extLst>
   </p:cSld>
@@ -1002,7 +1006,8 @@
           <a:p>
             <a:fld id="{A2845164-0F48-4D58-B7D4-F4224632171D}" type="datetime1">
               <a:rPr lang="de-DE" smtClean="0"/>
-              <a:t>01.06.2015</a:t>
+              <a:pPr/>
+              <a:t>10.06.2015</a:t>
             </a:fld>
             <a:endParaRPr lang="en-US" dirty="0"/>
           </a:p>
@@ -1058,7 +1063,7 @@
     </p:spTree>
     <p:extLst>
       <p:ext uri="{BB962C8B-B14F-4D97-AF65-F5344CB8AC3E}">
-        <p14:creationId xmlns:p14="http://schemas.microsoft.com/office/powerpoint/2010/main" xmlns="" val="2837294888"/>
+        <p14:creationId xmlns="" xmlns:p14="http://schemas.microsoft.com/office/powerpoint/2010/main" val="2837294888"/>
       </p:ext>
     </p:extLst>
   </p:cSld>
@@ -1263,7 +1268,8 @@
           <a:p>
             <a:fld id="{8EF85F82-E37F-4540-9E40-2E79E2DC6ADE}" type="datetime1">
               <a:rPr lang="de-DE" smtClean="0"/>
-              <a:t>01.06.2015</a:t>
+              <a:pPr/>
+              <a:t>10.06.2015</a:t>
             </a:fld>
             <a:endParaRPr lang="en-US" dirty="0"/>
           </a:p>
@@ -1319,7 +1325,7 @@
     </p:spTree>
     <p:extLst>
       <p:ext uri="{BB962C8B-B14F-4D97-AF65-F5344CB8AC3E}">
-        <p14:creationId xmlns:p14="http://schemas.microsoft.com/office/powerpoint/2010/main" xmlns="" val="2799996821"/>
+        <p14:creationId xmlns="" xmlns:p14="http://schemas.microsoft.com/office/powerpoint/2010/main" val="2799996821"/>
       </p:ext>
     </p:extLst>
   </p:cSld>
@@ -1438,7 +1444,8 @@
           <a:p>
             <a:fld id="{2DDC997A-E1DE-4642-AA4B-BD3883EA8A23}" type="datetime1">
               <a:rPr lang="de-DE" smtClean="0"/>
-              <a:t>01.06.2015</a:t>
+              <a:pPr/>
+              <a:t>10.06.2015</a:t>
             </a:fld>
             <a:endParaRPr lang="en-US" dirty="0"/>
           </a:p>
@@ -1494,7 +1501,7 @@
     </p:spTree>
     <p:extLst>
       <p:ext uri="{BB962C8B-B14F-4D97-AF65-F5344CB8AC3E}">
-        <p14:creationId xmlns:p14="http://schemas.microsoft.com/office/powerpoint/2010/main" xmlns="" val="3355165293"/>
+        <p14:creationId xmlns="" xmlns:p14="http://schemas.microsoft.com/office/powerpoint/2010/main" val="3355165293"/>
       </p:ext>
     </p:extLst>
   </p:cSld>
@@ -1786,7 +1793,8 @@
           <a:p>
             <a:fld id="{141039BF-75AD-47B6-B2FE-BB857E5D9596}" type="datetime1">
               <a:rPr lang="de-DE" smtClean="0"/>
-              <a:t>01.06.2015</a:t>
+              <a:pPr/>
+              <a:t>10.06.2015</a:t>
             </a:fld>
             <a:endParaRPr lang="en-US" dirty="0"/>
           </a:p>
@@ -1880,7 +1888,7 @@
     </p:spTree>
     <p:extLst>
       <p:ext uri="{BB962C8B-B14F-4D97-AF65-F5344CB8AC3E}">
-        <p14:creationId xmlns:p14="http://schemas.microsoft.com/office/powerpoint/2010/main" xmlns="" val="2624436341"/>
+        <p14:creationId xmlns="" xmlns:p14="http://schemas.microsoft.com/office/powerpoint/2010/main" val="2624436341"/>
       </p:ext>
     </p:extLst>
   </p:cSld>
@@ -2066,7 +2074,8 @@
           <a:p>
             <a:fld id="{B15BAFC3-9A23-4666-959E-5E36FCD086E7}" type="datetime1">
               <a:rPr lang="de-DE" smtClean="0"/>
-              <a:t>01.06.2015</a:t>
+              <a:pPr/>
+              <a:t>10.06.2015</a:t>
             </a:fld>
             <a:endParaRPr lang="en-US" dirty="0"/>
           </a:p>
@@ -2122,7 +2131,7 @@
     </p:spTree>
     <p:extLst>
       <p:ext uri="{BB962C8B-B14F-4D97-AF65-F5344CB8AC3E}">
-        <p14:creationId xmlns:p14="http://schemas.microsoft.com/office/powerpoint/2010/main" xmlns="" val="3951225455"/>
+        <p14:creationId xmlns="" xmlns:p14="http://schemas.microsoft.com/office/powerpoint/2010/main" val="3951225455"/>
       </p:ext>
     </p:extLst>
   </p:cSld>
@@ -2450,7 +2459,8 @@
           <a:p>
             <a:fld id="{7B1B55BF-9CD9-4994-BA1F-02E2FBCEB918}" type="datetime1">
               <a:rPr lang="de-DE" smtClean="0"/>
-              <a:t>01.06.2015</a:t>
+              <a:pPr/>
+              <a:t>10.06.2015</a:t>
             </a:fld>
             <a:endParaRPr lang="en-US" dirty="0"/>
           </a:p>
@@ -2506,7 +2516,7 @@
     </p:spTree>
     <p:extLst>
       <p:ext uri="{BB962C8B-B14F-4D97-AF65-F5344CB8AC3E}">
-        <p14:creationId xmlns:p14="http://schemas.microsoft.com/office/powerpoint/2010/main" xmlns="" val="2296925755"/>
+        <p14:creationId xmlns="" xmlns:p14="http://schemas.microsoft.com/office/powerpoint/2010/main" val="2296925755"/>
       </p:ext>
     </p:extLst>
   </p:cSld>
@@ -2573,7 +2583,8 @@
           <a:p>
             <a:fld id="{62E82DC3-09E8-4BD8-8ECB-4DF739DA760C}" type="datetime1">
               <a:rPr lang="de-DE" smtClean="0"/>
-              <a:t>01.06.2015</a:t>
+              <a:pPr/>
+              <a:t>10.06.2015</a:t>
             </a:fld>
             <a:endParaRPr lang="en-US" dirty="0"/>
           </a:p>
@@ -2629,7 +2640,7 @@
     </p:spTree>
     <p:extLst>
       <p:ext uri="{BB962C8B-B14F-4D97-AF65-F5344CB8AC3E}">
-        <p14:creationId xmlns:p14="http://schemas.microsoft.com/office/powerpoint/2010/main" xmlns="" val="856258981"/>
+        <p14:creationId xmlns="" xmlns:p14="http://schemas.microsoft.com/office/powerpoint/2010/main" val="856258981"/>
       </p:ext>
     </p:extLst>
   </p:cSld>
@@ -2749,7 +2760,8 @@
           <a:p>
             <a:fld id="{C73792DA-8F94-40B7-AFAB-167201D2BB07}" type="datetime1">
               <a:rPr lang="de-DE" smtClean="0"/>
-              <a:t>01.06.2015</a:t>
+              <a:pPr/>
+              <a:t>10.06.2015</a:t>
             </a:fld>
             <a:endParaRPr lang="en-US" dirty="0"/>
           </a:p>
@@ -2813,7 +2825,7 @@
     </p:spTree>
     <p:extLst>
       <p:ext uri="{BB962C8B-B14F-4D97-AF65-F5344CB8AC3E}">
-        <p14:creationId xmlns:p14="http://schemas.microsoft.com/office/powerpoint/2010/main" xmlns="" val="1257413516"/>
+        <p14:creationId xmlns="" xmlns:p14="http://schemas.microsoft.com/office/powerpoint/2010/main" val="1257413516"/>
       </p:ext>
     </p:extLst>
   </p:cSld>
@@ -3108,7 +3120,8 @@
           <a:p>
             <a:fld id="{71D88CAB-D144-4121-B0BA-48F74F2AA981}" type="datetime1">
               <a:rPr lang="de-DE" smtClean="0"/>
-              <a:t>01.06.2015</a:t>
+              <a:pPr/>
+              <a:t>10.06.2015</a:t>
             </a:fld>
             <a:endParaRPr lang="en-US" dirty="0"/>
           </a:p>
@@ -3185,7 +3198,7 @@
     </p:spTree>
     <p:extLst>
       <p:ext uri="{BB962C8B-B14F-4D97-AF65-F5344CB8AC3E}">
-        <p14:creationId xmlns:p14="http://schemas.microsoft.com/office/powerpoint/2010/main" xmlns="" val="112923765"/>
+        <p14:creationId xmlns="" xmlns:p14="http://schemas.microsoft.com/office/powerpoint/2010/main" val="112923765"/>
       </p:ext>
     </p:extLst>
   </p:cSld>
@@ -3490,7 +3503,8 @@
           <a:p>
             <a:fld id="{E19CC5BD-B0D2-499F-8B44-F84F9D4B93DC}" type="datetime1">
               <a:rPr lang="de-DE" smtClean="0"/>
-              <a:t>01.06.2015</a:t>
+              <a:pPr/>
+              <a:t>10.06.2015</a:t>
             </a:fld>
             <a:endParaRPr lang="en-US" dirty="0"/>
           </a:p>
@@ -3546,7 +3560,7 @@
     </p:spTree>
     <p:extLst>
       <p:ext uri="{BB962C8B-B14F-4D97-AF65-F5344CB8AC3E}">
-        <p14:creationId xmlns:p14="http://schemas.microsoft.com/office/powerpoint/2010/main" xmlns="" val="3348260142"/>
+        <p14:creationId xmlns="" xmlns:p14="http://schemas.microsoft.com/office/powerpoint/2010/main" val="3348260142"/>
       </p:ext>
     </p:extLst>
   </p:cSld>
@@ -3782,7 +3796,8 @@
           <a:p>
             <a:fld id="{87470D16-1792-4024-B1D2-A0A5F9C1C36F}" type="datetime1">
               <a:rPr lang="de-DE" smtClean="0"/>
-              <a:t>01.06.2015</a:t>
+              <a:pPr/>
+              <a:t>10.06.2015</a:t>
             </a:fld>
             <a:endParaRPr lang="en-US" dirty="0"/>
           </a:p>
@@ -3908,7 +3923,7 @@
     </p:spTree>
     <p:extLst>
       <p:ext uri="{BB962C8B-B14F-4D97-AF65-F5344CB8AC3E}">
-        <p14:creationId xmlns:p14="http://schemas.microsoft.com/office/powerpoint/2010/main" xmlns="" val="1039846697"/>
+        <p14:creationId xmlns="" xmlns:p14="http://schemas.microsoft.com/office/powerpoint/2010/main" val="1039846697"/>
       </p:ext>
     </p:extLst>
   </p:cSld>
@@ -4366,15 +4381,7 @@
             </a:r>
             <a:r>
               <a:rPr lang="de-DE" sz="2700" b="1" cap="none" dirty="0" smtClean="0"/>
-              <a:t> und </a:t>
-            </a:r>
-            <a:r>
-              <a:rPr lang="de-DE" sz="2700" b="1" cap="none" dirty="0" smtClean="0"/>
-              <a:t>A</a:t>
-            </a:r>
-            <a:r>
-              <a:rPr lang="de-DE" sz="2700" b="1" cap="none" dirty="0" smtClean="0"/>
-              <a:t>ndreas Maier</a:t>
+              <a:t> und Andreas Maier</a:t>
             </a:r>
             <a:endParaRPr lang="de-DE" sz="2700" b="1" cap="none" dirty="0"/>
           </a:p>
@@ -4403,21 +4410,302 @@
           <a:prstGeom prst="rect">
             <a:avLst/>
           </a:prstGeom>
-          <a:noFill/>
-          <a:ln w="9525">
+          <a:ln>
             <a:noFill/>
-            <a:miter lim="800000"/>
-            <a:headEnd/>
-            <a:tailEnd/>
           </a:ln>
+          <a:effectLst>
+            <a:outerShdw blurRad="292100" dist="139700" dir="2700000" algn="tl" rotWithShape="0">
+              <a:srgbClr val="333333">
+                <a:alpha val="65000"/>
+              </a:srgbClr>
+            </a:outerShdw>
+          </a:effectLst>
         </p:spPr>
       </p:pic>
     </p:spTree>
     <p:extLst>
       <p:ext uri="{BB962C8B-B14F-4D97-AF65-F5344CB8AC3E}">
-        <p14:creationId xmlns:p14="http://schemas.microsoft.com/office/powerpoint/2010/main" xmlns="" val="4100527049"/>
+        <p14:creationId xmlns="" xmlns:p14="http://schemas.microsoft.com/office/powerpoint/2010/main" val="4100527049"/>
       </p:ext>
     </p:extLst>
+  </p:cSld>
+  <p:clrMapOvr>
+    <a:masterClrMapping/>
+  </p:clrMapOvr>
+  <p:timing>
+    <p:tnLst>
+      <p:par>
+        <p:cTn id="1" dur="indefinite" restart="never" nodeType="tmRoot"/>
+      </p:par>
+    </p:tnLst>
+  </p:timing>
+</p:sld>
+</file>
+
+<file path=ppt/slides/slide10.xml><?xml version="1.0" encoding="utf-8"?>
+<p:sld xmlns:a="http://schemas.openxmlformats.org/drawingml/2006/main" xmlns:r="http://schemas.openxmlformats.org/officeDocument/2006/relationships" xmlns:p="http://schemas.openxmlformats.org/presentationml/2006/main">
+  <p:cSld>
+    <p:spTree>
+      <p:nvGrpSpPr>
+        <p:cNvPr id="1" name=""/>
+        <p:cNvGrpSpPr/>
+        <p:nvPr/>
+      </p:nvGrpSpPr>
+      <p:grpSpPr>
+        <a:xfrm>
+          <a:off x="0" y="0"/>
+          <a:ext cx="0" cy="0"/>
+          <a:chOff x="0" y="0"/>
+          <a:chExt cx="0" cy="0"/>
+        </a:xfrm>
+      </p:grpSpPr>
+      <p:sp>
+        <p:nvSpPr>
+          <p:cNvPr id="2" name="Titel 1"/>
+          <p:cNvSpPr>
+            <a:spLocks noGrp="1"/>
+          </p:cNvSpPr>
+          <p:nvPr>
+            <p:ph type="title"/>
+          </p:nvPr>
+        </p:nvSpPr>
+        <p:spPr>
+          <a:xfrm>
+            <a:off x="822959" y="286604"/>
+            <a:ext cx="5422857" cy="1450757"/>
+          </a:xfrm>
+        </p:spPr>
+        <p:txBody>
+          <a:bodyPr/>
+          <a:lstStyle/>
+          <a:p>
+            <a:r>
+              <a:rPr lang="de-DE" b="1" dirty="0" smtClean="0"/>
+              <a:t>Nebenläufigkeit</a:t>
+            </a:r>
+            <a:endParaRPr lang="de-DE" b="1" dirty="0"/>
+          </a:p>
+        </p:txBody>
+      </p:sp>
+      <p:sp>
+        <p:nvSpPr>
+          <p:cNvPr id="7" name="Datumsplatzhalter 6"/>
+          <p:cNvSpPr>
+            <a:spLocks noGrp="1"/>
+          </p:cNvSpPr>
+          <p:nvPr>
+            <p:ph type="dt" sz="half" idx="10"/>
+          </p:nvPr>
+        </p:nvSpPr>
+        <p:spPr/>
+        <p:txBody>
+          <a:bodyPr/>
+          <a:lstStyle/>
+          <a:p>
+            <a:fld id="{EEF01910-E735-476D-980E-B979AA991A9A}" type="datetime1">
+              <a:rPr lang="de-DE" smtClean="0"/>
+              <a:pPr/>
+              <a:t>10.06.2015</a:t>
+            </a:fld>
+            <a:endParaRPr lang="en-US" dirty="0"/>
+          </a:p>
+        </p:txBody>
+      </p:sp>
+      <p:sp>
+        <p:nvSpPr>
+          <p:cNvPr id="8" name="Foliennummernplatzhalter 7"/>
+          <p:cNvSpPr>
+            <a:spLocks noGrp="1"/>
+          </p:cNvSpPr>
+          <p:nvPr>
+            <p:ph type="sldNum" sz="quarter" idx="12"/>
+          </p:nvPr>
+        </p:nvSpPr>
+        <p:spPr/>
+        <p:txBody>
+          <a:bodyPr/>
+          <a:lstStyle/>
+          <a:p>
+            <a:fld id="{4FAB73BC-B049-4115-A692-8D63A059BFB8}" type="slidenum">
+              <a:rPr lang="en-US" smtClean="0"/>
+              <a:pPr/>
+              <a:t>10</a:t>
+            </a:fld>
+            <a:endParaRPr lang="en-US" dirty="0"/>
+          </a:p>
+        </p:txBody>
+      </p:sp>
+      <p:sp>
+        <p:nvSpPr>
+          <p:cNvPr id="9" name="Fußzeilenplatzhalter 8"/>
+          <p:cNvSpPr>
+            <a:spLocks noGrp="1"/>
+          </p:cNvSpPr>
+          <p:nvPr>
+            <p:ph type="ftr" sz="quarter" idx="11"/>
+          </p:nvPr>
+        </p:nvSpPr>
+        <p:spPr/>
+        <p:txBody>
+          <a:bodyPr/>
+          <a:lstStyle/>
+          <a:p>
+            <a:r>
+              <a:rPr lang="en-US" smtClean="0"/>
+              <a:t>Software Architektur Präsentation - SS2015</a:t>
+            </a:r>
+            <a:endParaRPr lang="en-US" dirty="0"/>
+          </a:p>
+        </p:txBody>
+      </p:sp>
+    </p:spTree>
+  </p:cSld>
+  <p:clrMapOvr>
+    <a:masterClrMapping/>
+  </p:clrMapOvr>
+  <p:timing>
+    <p:tnLst>
+      <p:par>
+        <p:cTn id="1" dur="indefinite" restart="never" nodeType="tmRoot"/>
+      </p:par>
+    </p:tnLst>
+  </p:timing>
+</p:sld>
+</file>
+
+<file path=ppt/slides/slide11.xml><?xml version="1.0" encoding="utf-8"?>
+<p:sld xmlns:a="http://schemas.openxmlformats.org/drawingml/2006/main" xmlns:r="http://schemas.openxmlformats.org/officeDocument/2006/relationships" xmlns:p="http://schemas.openxmlformats.org/presentationml/2006/main">
+  <p:cSld>
+    <p:spTree>
+      <p:nvGrpSpPr>
+        <p:cNvPr id="1" name=""/>
+        <p:cNvGrpSpPr/>
+        <p:nvPr/>
+      </p:nvGrpSpPr>
+      <p:grpSpPr>
+        <a:xfrm>
+          <a:off x="0" y="0"/>
+          <a:ext cx="0" cy="0"/>
+          <a:chOff x="0" y="0"/>
+          <a:chExt cx="0" cy="0"/>
+        </a:xfrm>
+      </p:grpSpPr>
+      <p:sp>
+        <p:nvSpPr>
+          <p:cNvPr id="2" name="Titel 1"/>
+          <p:cNvSpPr>
+            <a:spLocks noGrp="1"/>
+          </p:cNvSpPr>
+          <p:nvPr>
+            <p:ph type="title"/>
+          </p:nvPr>
+        </p:nvSpPr>
+        <p:spPr/>
+        <p:txBody>
+          <a:bodyPr>
+            <a:normAutofit/>
+          </a:bodyPr>
+          <a:lstStyle/>
+          <a:p>
+            <a:r>
+              <a:rPr lang="de-DE" sz="5400" b="1" dirty="0" smtClean="0"/>
+              <a:t>Vielen Dank für Ihre Aufmerksamkeit</a:t>
+            </a:r>
+            <a:endParaRPr lang="de-DE" sz="5400" b="1" dirty="0"/>
+          </a:p>
+        </p:txBody>
+      </p:sp>
+      <p:sp>
+        <p:nvSpPr>
+          <p:cNvPr id="3" name="Textplatzhalter 2"/>
+          <p:cNvSpPr>
+            <a:spLocks noGrp="1"/>
+          </p:cNvSpPr>
+          <p:nvPr>
+            <p:ph type="body" idx="1"/>
+          </p:nvPr>
+        </p:nvSpPr>
+        <p:spPr/>
+        <p:txBody>
+          <a:bodyPr/>
+          <a:lstStyle/>
+          <a:p>
+            <a:endParaRPr lang="de-DE" dirty="0"/>
+          </a:p>
+        </p:txBody>
+      </p:sp>
+      <p:sp>
+        <p:nvSpPr>
+          <p:cNvPr id="5" name="Datumsplatzhalter 4"/>
+          <p:cNvSpPr>
+            <a:spLocks noGrp="1"/>
+          </p:cNvSpPr>
+          <p:nvPr>
+            <p:ph type="dt" sz="half" idx="10"/>
+          </p:nvPr>
+        </p:nvSpPr>
+        <p:spPr/>
+        <p:txBody>
+          <a:bodyPr/>
+          <a:lstStyle/>
+          <a:p>
+            <a:fld id="{14D1886A-1E1A-4BBA-8E28-CE7DA8C564DE}" type="datetime1">
+              <a:rPr lang="de-DE" smtClean="0"/>
+              <a:pPr/>
+              <a:t>10.06.2015</a:t>
+            </a:fld>
+            <a:endParaRPr lang="en-US" dirty="0"/>
+          </a:p>
+        </p:txBody>
+      </p:sp>
+      <p:sp>
+        <p:nvSpPr>
+          <p:cNvPr id="6" name="Foliennummernplatzhalter 5"/>
+          <p:cNvSpPr>
+            <a:spLocks noGrp="1"/>
+          </p:cNvSpPr>
+          <p:nvPr>
+            <p:ph type="sldNum" sz="quarter" idx="12"/>
+          </p:nvPr>
+        </p:nvSpPr>
+        <p:spPr/>
+        <p:txBody>
+          <a:bodyPr/>
+          <a:lstStyle/>
+          <a:p>
+            <a:fld id="{4FAB73BC-B049-4115-A692-8D63A059BFB8}" type="slidenum">
+              <a:rPr lang="en-US" smtClean="0"/>
+              <a:pPr/>
+              <a:t>11</a:t>
+            </a:fld>
+            <a:endParaRPr lang="en-US" dirty="0"/>
+          </a:p>
+        </p:txBody>
+      </p:sp>
+      <p:sp>
+        <p:nvSpPr>
+          <p:cNvPr id="7" name="Fußzeilenplatzhalter 6"/>
+          <p:cNvSpPr>
+            <a:spLocks noGrp="1"/>
+          </p:cNvSpPr>
+          <p:nvPr>
+            <p:ph type="ftr" sz="quarter" idx="11"/>
+          </p:nvPr>
+        </p:nvSpPr>
+        <p:spPr/>
+        <p:txBody>
+          <a:bodyPr/>
+          <a:lstStyle/>
+          <a:p>
+            <a:r>
+              <a:rPr lang="en-US" smtClean="0"/>
+              <a:t>Software Architektur Präsentation - SS2015</a:t>
+            </a:r>
+            <a:endParaRPr lang="en-US" dirty="0"/>
+          </a:p>
+        </p:txBody>
+      </p:sp>
+    </p:spTree>
   </p:cSld>
   <p:clrMapOvr>
     <a:masterClrMapping/>
@@ -4516,8 +4804,9 @@
             </a:pPr>
             <a:r>
               <a:rPr lang="de-DE" sz="3200" dirty="0" smtClean="0"/>
-              <a:t>Die Umsetzung</a:t>
-            </a:r>
+              <a:t>Views</a:t>
+            </a:r>
+            <a:endParaRPr lang="de-DE" sz="3200" dirty="0" smtClean="0"/>
           </a:p>
           <a:p>
             <a:pPr marL="531813" lvl="1" indent="-354013">
@@ -4529,8 +4818,9 @@
             </a:pPr>
             <a:r>
               <a:rPr lang="de-DE" sz="3200" dirty="0" smtClean="0"/>
-              <a:t>Tätigkeiten</a:t>
-            </a:r>
+              <a:t>TO-DOs</a:t>
+            </a:r>
+            <a:endParaRPr lang="de-DE" sz="3200" dirty="0" smtClean="0"/>
           </a:p>
           <a:p>
             <a:pPr marL="898525" lvl="2" indent="-363538">
@@ -4613,7 +4903,8 @@
           <a:p>
             <a:fld id="{63BA7107-135F-4272-B660-DC5C627C7572}" type="datetime1">
               <a:rPr lang="de-DE" smtClean="0"/>
-              <a:t>01.06.2015</a:t>
+              <a:pPr/>
+              <a:t>10.06.2015</a:t>
             </a:fld>
             <a:endParaRPr lang="en-US" dirty="0"/>
           </a:p>
@@ -4845,7 +5136,8 @@
           <a:p>
             <a:fld id="{5BBF3383-53D5-432D-AF13-3F33FADF3634}" type="datetime1">
               <a:rPr lang="de-DE" smtClean="0"/>
-              <a:t>01.06.2015</a:t>
+              <a:pPr/>
+              <a:t>10.06.2015</a:t>
             </a:fld>
             <a:endParaRPr lang="en-US" dirty="0"/>
           </a:p>
@@ -5035,18 +5327,21 @@
         <p:spPr bwMode="auto">
           <a:xfrm>
             <a:off x="5965371" y="1792761"/>
-            <a:ext cx="2641600" cy="4460852"/>
+            <a:ext cx="2545207" cy="4298073"/>
           </a:xfrm>
           <a:prstGeom prst="rect">
             <a:avLst/>
           </a:prstGeom>
-          <a:noFill/>
-          <a:ln w="9525">
+          <a:ln>
             <a:noFill/>
-            <a:miter lim="800000"/>
-            <a:headEnd/>
-            <a:tailEnd/>
           </a:ln>
+          <a:effectLst>
+            <a:outerShdw blurRad="292100" dist="139700" dir="2700000" algn="tl" rotWithShape="0">
+              <a:srgbClr val="333333">
+                <a:alpha val="65000"/>
+              </a:srgbClr>
+            </a:outerShdw>
+          </a:effectLst>
         </p:spPr>
       </p:pic>
       <p:sp>
@@ -5066,7 +5361,8 @@
           <a:p>
             <a:fld id="{D8E9E448-2B95-4BAB-A070-BBA0EF87464D}" type="datetime1">
               <a:rPr lang="de-DE" smtClean="0"/>
-              <a:t>01.06.2015</a:t>
+              <a:pPr/>
+              <a:t>10.06.2015</a:t>
             </a:fld>
             <a:endParaRPr lang="en-US" dirty="0"/>
           </a:p>
@@ -5173,7 +5469,7 @@
           <a:p>
             <a:r>
               <a:rPr lang="de-DE" b="1" dirty="0" smtClean="0"/>
-              <a:t>Die Umsetzung</a:t>
+              <a:t>Views</a:t>
             </a:r>
             <a:endParaRPr lang="de-DE" b="1" dirty="0"/>
           </a:p>
@@ -5215,7 +5511,8 @@
           <a:p>
             <a:fld id="{EEF01910-E735-476D-980E-B979AA991A9A}" type="datetime1">
               <a:rPr lang="de-DE" smtClean="0"/>
-              <a:t>01.06.2015</a:t>
+              <a:pPr/>
+              <a:t>10.06.2015</a:t>
             </a:fld>
             <a:endParaRPr lang="en-US" dirty="0"/>
           </a:p>
@@ -5285,19 +5582,22 @@
         </p:blipFill>
         <p:spPr bwMode="auto">
           <a:xfrm>
-            <a:off x="5297100" y="1776218"/>
-            <a:ext cx="2278743" cy="2072035"/>
+            <a:off x="5297101" y="1776218"/>
+            <a:ext cx="2137248" cy="1943375"/>
           </a:xfrm>
           <a:prstGeom prst="rect">
             <a:avLst/>
           </a:prstGeom>
-          <a:noFill/>
-          <a:ln w="9525">
+          <a:ln>
             <a:noFill/>
-            <a:miter lim="800000"/>
-            <a:headEnd/>
-            <a:tailEnd/>
           </a:ln>
+          <a:effectLst>
+            <a:outerShdw blurRad="292100" dist="139700" dir="2700000" algn="tl" rotWithShape="0">
+              <a:srgbClr val="333333">
+                <a:alpha val="65000"/>
+              </a:srgbClr>
+            </a:outerShdw>
+          </a:effectLst>
         </p:spPr>
       </p:pic>
       <p:pic>
@@ -5323,13 +5623,16 @@
           <a:prstGeom prst="rect">
             <a:avLst/>
           </a:prstGeom>
-          <a:noFill/>
-          <a:ln w="9525">
+          <a:ln>
             <a:noFill/>
-            <a:miter lim="800000"/>
-            <a:headEnd/>
-            <a:tailEnd/>
           </a:ln>
+          <a:effectLst>
+            <a:outerShdw blurRad="292100" dist="139700" dir="2700000" algn="tl" rotWithShape="0">
+              <a:srgbClr val="333333">
+                <a:alpha val="65000"/>
+              </a:srgbClr>
+            </a:outerShdw>
+          </a:effectLst>
         </p:spPr>
       </p:pic>
       <p:pic>
@@ -5355,13 +5658,16 @@
           <a:prstGeom prst="rect">
             <a:avLst/>
           </a:prstGeom>
-          <a:noFill/>
-          <a:ln w="9525">
+          <a:ln>
             <a:noFill/>
-            <a:miter lim="800000"/>
-            <a:headEnd/>
-            <a:tailEnd/>
           </a:ln>
+          <a:effectLst>
+            <a:outerShdw blurRad="292100" dist="139700" dir="2700000" algn="tl" rotWithShape="0">
+              <a:srgbClr val="333333">
+                <a:alpha val="65000"/>
+              </a:srgbClr>
+            </a:outerShdw>
+          </a:effectLst>
         </p:spPr>
       </p:pic>
     </p:spTree>
@@ -5418,28 +5724,9 @@
           <a:p>
             <a:r>
               <a:rPr lang="de-DE" b="1" dirty="0" smtClean="0"/>
-              <a:t>Tätigkeiten</a:t>
+              <a:t>Das Projekt</a:t>
             </a:r>
             <a:endParaRPr lang="de-DE" b="1" dirty="0"/>
-          </a:p>
-        </p:txBody>
-      </p:sp>
-      <p:sp>
-        <p:nvSpPr>
-          <p:cNvPr id="6" name="Inhaltsplatzhalter 5"/>
-          <p:cNvSpPr>
-            <a:spLocks noGrp="1"/>
-          </p:cNvSpPr>
-          <p:nvPr>
-            <p:ph idx="1"/>
-          </p:nvPr>
-        </p:nvSpPr>
-        <p:spPr/>
-        <p:txBody>
-          <a:bodyPr/>
-          <a:lstStyle/>
-          <a:p>
-            <a:endParaRPr lang="de-DE" dirty="0"/>
           </a:p>
         </p:txBody>
       </p:sp>
@@ -5460,7 +5747,8 @@
           <a:p>
             <a:fld id="{EEF01910-E735-476D-980E-B979AA991A9A}" type="datetime1">
               <a:rPr lang="de-DE" smtClean="0"/>
-              <a:t>01.06.2015</a:t>
+              <a:pPr/>
+              <a:t>10.06.2015</a:t>
             </a:fld>
             <a:endParaRPr lang="en-US" dirty="0"/>
           </a:p>
@@ -5515,11 +5803,13 @@
       </p:sp>
       <p:pic>
         <p:nvPicPr>
-          <p:cNvPr id="21506" name="Picture 2"/>
+          <p:cNvPr id="2050" name="Picture 2"/>
           <p:cNvPicPr>
-            <a:picLocks noChangeAspect="1" noChangeArrowheads="1"/>
+            <a:picLocks noGrp="1" noChangeAspect="1" noChangeArrowheads="1"/>
           </p:cNvPicPr>
-          <p:nvPr/>
+          <p:nvPr>
+            <p:ph idx="1"/>
+          </p:nvPr>
         </p:nvPicPr>
         <p:blipFill>
           <a:blip r:embed="rId2"/>
@@ -5530,19 +5820,92 @@
         </p:blipFill>
         <p:spPr bwMode="auto">
           <a:xfrm>
-            <a:off x="903342" y="1945036"/>
-            <a:ext cx="6392786" cy="3886120"/>
+            <a:off x="913439" y="4826939"/>
+            <a:ext cx="4591933" cy="1349078"/>
           </a:xfrm>
           <a:prstGeom prst="rect">
             <a:avLst/>
           </a:prstGeom>
-          <a:noFill/>
-          <a:ln w="9525">
+          <a:ln>
             <a:noFill/>
-            <a:miter lim="800000"/>
-            <a:headEnd/>
-            <a:tailEnd/>
           </a:ln>
+          <a:effectLst>
+            <a:outerShdw blurRad="292100" dist="139700" dir="2700000" algn="tl" rotWithShape="0">
+              <a:srgbClr val="333333">
+                <a:alpha val="65000"/>
+              </a:srgbClr>
+            </a:outerShdw>
+          </a:effectLst>
+        </p:spPr>
+      </p:pic>
+      <p:pic>
+        <p:nvPicPr>
+          <p:cNvPr id="2051" name="Picture 3"/>
+          <p:cNvPicPr>
+            <a:picLocks noChangeAspect="1" noChangeArrowheads="1"/>
+          </p:cNvPicPr>
+          <p:nvPr/>
+        </p:nvPicPr>
+        <p:blipFill>
+          <a:blip r:embed="rId3"/>
+          <a:srcRect/>
+          <a:stretch>
+            <a:fillRect/>
+          </a:stretch>
+        </p:blipFill>
+        <p:spPr bwMode="auto">
+          <a:xfrm>
+            <a:off x="5866108" y="1790053"/>
+            <a:ext cx="2541624" cy="4378272"/>
+          </a:xfrm>
+          <a:prstGeom prst="rect">
+            <a:avLst/>
+          </a:prstGeom>
+          <a:ln>
+            <a:noFill/>
+          </a:ln>
+          <a:effectLst>
+            <a:outerShdw blurRad="292100" dist="139700" dir="2700000" algn="tl" rotWithShape="0">
+              <a:srgbClr val="333333">
+                <a:alpha val="65000"/>
+              </a:srgbClr>
+            </a:outerShdw>
+          </a:effectLst>
+        </p:spPr>
+      </p:pic>
+      <p:pic>
+        <p:nvPicPr>
+          <p:cNvPr id="10" name="Picture 2"/>
+          <p:cNvPicPr>
+            <a:picLocks noChangeAspect="1" noChangeArrowheads="1"/>
+          </p:cNvPicPr>
+          <p:nvPr/>
+        </p:nvPicPr>
+        <p:blipFill>
+          <a:blip r:embed="rId4"/>
+          <a:srcRect/>
+          <a:stretch>
+            <a:fillRect/>
+          </a:stretch>
+        </p:blipFill>
+        <p:spPr bwMode="auto">
+          <a:xfrm>
+            <a:off x="906706" y="1790681"/>
+            <a:ext cx="4572001" cy="2779281"/>
+          </a:xfrm>
+          <a:prstGeom prst="rect">
+            <a:avLst/>
+          </a:prstGeom>
+          <a:ln>
+            <a:noFill/>
+          </a:ln>
+          <a:effectLst>
+            <a:outerShdw blurRad="292100" dist="139700" dir="2700000" algn="tl" rotWithShape="0">
+              <a:srgbClr val="333333">
+                <a:alpha val="65000"/>
+              </a:srgbClr>
+            </a:outerShdw>
+          </a:effectLst>
         </p:spPr>
       </p:pic>
     </p:spTree>
@@ -5599,28 +5962,9 @@
           <a:p>
             <a:r>
               <a:rPr lang="de-DE" b="1" dirty="0" smtClean="0"/>
-              <a:t>Tätigkeiten</a:t>
+              <a:t>Plug-Ins</a:t>
             </a:r>
             <a:endParaRPr lang="de-DE" b="1" dirty="0"/>
-          </a:p>
-        </p:txBody>
-      </p:sp>
-      <p:sp>
-        <p:nvSpPr>
-          <p:cNvPr id="6" name="Inhaltsplatzhalter 5"/>
-          <p:cNvSpPr>
-            <a:spLocks noGrp="1"/>
-          </p:cNvSpPr>
-          <p:nvPr>
-            <p:ph idx="1"/>
-          </p:nvPr>
-        </p:nvSpPr>
-        <p:spPr/>
-        <p:txBody>
-          <a:bodyPr/>
-          <a:lstStyle/>
-          <a:p>
-            <a:endParaRPr lang="de-DE" dirty="0"/>
           </a:p>
         </p:txBody>
       </p:sp>
@@ -5641,7 +5985,8 @@
           <a:p>
             <a:fld id="{EEF01910-E735-476D-980E-B979AA991A9A}" type="datetime1">
               <a:rPr lang="de-DE" smtClean="0"/>
-              <a:t>01.06.2015</a:t>
+              <a:pPr/>
+              <a:t>10.06.2015</a:t>
             </a:fld>
             <a:endParaRPr lang="en-US" dirty="0"/>
           </a:p>
@@ -5694,6 +6039,76 @@
           </a:p>
         </p:txBody>
       </p:sp>
+      <p:pic>
+        <p:nvPicPr>
+          <p:cNvPr id="4098" name="Picture 2"/>
+          <p:cNvPicPr>
+            <a:picLocks noChangeAspect="1" noChangeArrowheads="1"/>
+          </p:cNvPicPr>
+          <p:nvPr/>
+        </p:nvPicPr>
+        <p:blipFill>
+          <a:blip r:embed="rId2"/>
+          <a:srcRect l="40061" t="17628" r="39956" b="59788"/>
+          <a:stretch>
+            <a:fillRect/>
+          </a:stretch>
+        </p:blipFill>
+        <p:spPr bwMode="auto">
+          <a:xfrm>
+            <a:off x="891153" y="1859797"/>
+            <a:ext cx="3488296" cy="3696346"/>
+          </a:xfrm>
+          <a:prstGeom prst="rect">
+            <a:avLst/>
+          </a:prstGeom>
+          <a:ln>
+            <a:noFill/>
+          </a:ln>
+          <a:effectLst>
+            <a:outerShdw blurRad="292100" dist="139700" dir="2700000" algn="tl" rotWithShape="0">
+              <a:srgbClr val="333333">
+                <a:alpha val="65000"/>
+              </a:srgbClr>
+            </a:outerShdw>
+          </a:effectLst>
+        </p:spPr>
+      </p:pic>
+      <p:pic>
+        <p:nvPicPr>
+          <p:cNvPr id="4099" name="Picture 3"/>
+          <p:cNvPicPr>
+            <a:picLocks noChangeAspect="1" noChangeArrowheads="1"/>
+          </p:cNvPicPr>
+          <p:nvPr/>
+        </p:nvPicPr>
+        <p:blipFill>
+          <a:blip r:embed="rId3"/>
+          <a:srcRect l="40032" t="17662" r="40008" b="59854"/>
+          <a:stretch>
+            <a:fillRect/>
+          </a:stretch>
+        </p:blipFill>
+        <p:spPr bwMode="auto">
+          <a:xfrm>
+            <a:off x="4843220" y="1859796"/>
+            <a:ext cx="3487119" cy="3682586"/>
+          </a:xfrm>
+          <a:prstGeom prst="rect">
+            <a:avLst/>
+          </a:prstGeom>
+          <a:ln>
+            <a:noFill/>
+          </a:ln>
+          <a:effectLst>
+            <a:outerShdw blurRad="292100" dist="139700" dir="2700000" algn="tl" rotWithShape="0">
+              <a:srgbClr val="333333">
+                <a:alpha val="65000"/>
+              </a:srgbClr>
+            </a:outerShdw>
+          </a:effectLst>
+        </p:spPr>
+      </p:pic>
     </p:spTree>
   </p:cSld>
   <p:clrMapOvr>
@@ -5736,43 +6151,27 @@
             <p:ph type="title"/>
           </p:nvPr>
         </p:nvSpPr>
-        <p:spPr/>
-        <p:txBody>
-          <a:bodyPr>
-            <a:normAutofit/>
-          </a:bodyPr>
-          <a:lstStyle/>
-          <a:p>
-            <a:r>
-              <a:rPr lang="de-DE" sz="5400" b="1" dirty="0" smtClean="0"/>
-              <a:t>Vielen Dank für Ihre Aufmerksamkeit</a:t>
-            </a:r>
-            <a:endParaRPr lang="de-DE" sz="5400" b="1" dirty="0"/>
-          </a:p>
-        </p:txBody>
-      </p:sp>
-      <p:sp>
-        <p:nvSpPr>
-          <p:cNvPr id="3" name="Textplatzhalter 2"/>
-          <p:cNvSpPr>
-            <a:spLocks noGrp="1"/>
-          </p:cNvSpPr>
-          <p:nvPr>
-            <p:ph type="body" idx="1"/>
-          </p:nvPr>
-        </p:nvSpPr>
-        <p:spPr/>
-        <p:txBody>
-          <a:bodyPr/>
-          <a:lstStyle/>
-          <a:p>
-            <a:endParaRPr lang="de-DE" dirty="0"/>
-          </a:p>
-        </p:txBody>
-      </p:sp>
-      <p:sp>
-        <p:nvSpPr>
-          <p:cNvPr id="5" name="Datumsplatzhalter 4"/>
+        <p:spPr>
+          <a:xfrm>
+            <a:off x="822959" y="286604"/>
+            <a:ext cx="5422857" cy="1450757"/>
+          </a:xfrm>
+        </p:spPr>
+        <p:txBody>
+          <a:bodyPr/>
+          <a:lstStyle/>
+          <a:p>
+            <a:r>
+              <a:rPr lang="de-DE" b="1" dirty="0" smtClean="0"/>
+              <a:t>Persistenz</a:t>
+            </a:r>
+            <a:endParaRPr lang="de-DE" b="1" dirty="0"/>
+          </a:p>
+        </p:txBody>
+      </p:sp>
+      <p:sp>
+        <p:nvSpPr>
+          <p:cNvPr id="7" name="Datumsplatzhalter 6"/>
           <p:cNvSpPr>
             <a:spLocks noGrp="1"/>
           </p:cNvSpPr>
@@ -5785,9 +6184,10 @@
           <a:bodyPr/>
           <a:lstStyle/>
           <a:p>
-            <a:fld id="{14D1886A-1E1A-4BBA-8E28-CE7DA8C564DE}" type="datetime1">
+            <a:fld id="{EEF01910-E735-476D-980E-B979AA991A9A}" type="datetime1">
               <a:rPr lang="de-DE" smtClean="0"/>
-              <a:t>01.06.2015</a:t>
+              <a:pPr/>
+              <a:t>10.06.2015</a:t>
             </a:fld>
             <a:endParaRPr lang="en-US" dirty="0"/>
           </a:p>
@@ -5795,7 +6195,7 @@
       </p:sp>
       <p:sp>
         <p:nvSpPr>
-          <p:cNvPr id="6" name="Foliennummernplatzhalter 5"/>
+          <p:cNvPr id="8" name="Foliennummernplatzhalter 7"/>
           <p:cNvSpPr>
             <a:spLocks noGrp="1"/>
           </p:cNvSpPr>
@@ -5819,7 +6219,208 @@
       </p:sp>
       <p:sp>
         <p:nvSpPr>
-          <p:cNvPr id="7" name="Fußzeilenplatzhalter 6"/>
+          <p:cNvPr id="9" name="Fußzeilenplatzhalter 8"/>
+          <p:cNvSpPr>
+            <a:spLocks noGrp="1"/>
+          </p:cNvSpPr>
+          <p:nvPr>
+            <p:ph type="ftr" sz="quarter" idx="11"/>
+          </p:nvPr>
+        </p:nvSpPr>
+        <p:spPr/>
+        <p:txBody>
+          <a:bodyPr/>
+          <a:lstStyle/>
+          <a:p>
+            <a:r>
+              <a:rPr lang="en-US" smtClean="0"/>
+              <a:t>Software Architektur Präsentation - SS2015</a:t>
+            </a:r>
+            <a:endParaRPr lang="en-US" dirty="0"/>
+          </a:p>
+        </p:txBody>
+      </p:sp>
+      <p:pic>
+        <p:nvPicPr>
+          <p:cNvPr id="3078" name="Picture 6"/>
+          <p:cNvPicPr>
+            <a:picLocks noChangeAspect="1" noChangeArrowheads="1"/>
+          </p:cNvPicPr>
+          <p:nvPr/>
+        </p:nvPicPr>
+        <p:blipFill>
+          <a:blip r:embed="rId2"/>
+          <a:srcRect b="37890"/>
+          <a:stretch>
+            <a:fillRect/>
+          </a:stretch>
+        </p:blipFill>
+        <p:spPr bwMode="auto">
+          <a:xfrm>
+            <a:off x="5380010" y="1800305"/>
+            <a:ext cx="3028950" cy="4371895"/>
+          </a:xfrm>
+          <a:prstGeom prst="rect">
+            <a:avLst/>
+          </a:prstGeom>
+          <a:ln>
+            <a:noFill/>
+          </a:ln>
+          <a:effectLst>
+            <a:outerShdw blurRad="292100" dist="139700" dir="2700000" algn="tl" rotWithShape="0">
+              <a:srgbClr val="333333">
+                <a:alpha val="65000"/>
+              </a:srgbClr>
+            </a:outerShdw>
+          </a:effectLst>
+        </p:spPr>
+      </p:pic>
+      <p:pic>
+        <p:nvPicPr>
+          <p:cNvPr id="3079" name="Picture 7"/>
+          <p:cNvPicPr>
+            <a:picLocks noChangeAspect="1" noChangeArrowheads="1"/>
+          </p:cNvPicPr>
+          <p:nvPr/>
+        </p:nvPicPr>
+        <p:blipFill>
+          <a:blip r:embed="rId3"/>
+          <a:srcRect/>
+          <a:stretch>
+            <a:fillRect/>
+          </a:stretch>
+        </p:blipFill>
+        <p:spPr bwMode="auto">
+          <a:xfrm>
+            <a:off x="877591" y="1796110"/>
+            <a:ext cx="4056359" cy="4370244"/>
+          </a:xfrm>
+          <a:prstGeom prst="rect">
+            <a:avLst/>
+          </a:prstGeom>
+          <a:ln>
+            <a:noFill/>
+          </a:ln>
+          <a:effectLst>
+            <a:outerShdw blurRad="292100" dist="139700" dir="2700000" algn="tl" rotWithShape="0">
+              <a:srgbClr val="333333">
+                <a:alpha val="65000"/>
+              </a:srgbClr>
+            </a:outerShdw>
+          </a:effectLst>
+        </p:spPr>
+      </p:pic>
+    </p:spTree>
+  </p:cSld>
+  <p:clrMapOvr>
+    <a:masterClrMapping/>
+  </p:clrMapOvr>
+  <p:timing>
+    <p:tnLst>
+      <p:par>
+        <p:cTn id="1" dur="indefinite" restart="never" nodeType="tmRoot"/>
+      </p:par>
+    </p:tnLst>
+  </p:timing>
+</p:sld>
+</file>
+
+<file path=ppt/slides/slide9.xml><?xml version="1.0" encoding="utf-8"?>
+<p:sld xmlns:a="http://schemas.openxmlformats.org/drawingml/2006/main" xmlns:r="http://schemas.openxmlformats.org/officeDocument/2006/relationships" xmlns:p="http://schemas.openxmlformats.org/presentationml/2006/main">
+  <p:cSld>
+    <p:spTree>
+      <p:nvGrpSpPr>
+        <p:cNvPr id="1" name=""/>
+        <p:cNvGrpSpPr/>
+        <p:nvPr/>
+      </p:nvGrpSpPr>
+      <p:grpSpPr>
+        <a:xfrm>
+          <a:off x="0" y="0"/>
+          <a:ext cx="0" cy="0"/>
+          <a:chOff x="0" y="0"/>
+          <a:chExt cx="0" cy="0"/>
+        </a:xfrm>
+      </p:grpSpPr>
+      <p:sp>
+        <p:nvSpPr>
+          <p:cNvPr id="2" name="Titel 1"/>
+          <p:cNvSpPr>
+            <a:spLocks noGrp="1"/>
+          </p:cNvSpPr>
+          <p:nvPr>
+            <p:ph type="title"/>
+          </p:nvPr>
+        </p:nvSpPr>
+        <p:spPr>
+          <a:xfrm>
+            <a:off x="822959" y="286604"/>
+            <a:ext cx="5422857" cy="1450757"/>
+          </a:xfrm>
+        </p:spPr>
+        <p:txBody>
+          <a:bodyPr/>
+          <a:lstStyle/>
+          <a:p>
+            <a:r>
+              <a:rPr lang="de-DE" b="1" dirty="0" smtClean="0"/>
+              <a:t>Performance</a:t>
+            </a:r>
+            <a:endParaRPr lang="de-DE" b="1" dirty="0"/>
+          </a:p>
+        </p:txBody>
+      </p:sp>
+      <p:sp>
+        <p:nvSpPr>
+          <p:cNvPr id="7" name="Datumsplatzhalter 6"/>
+          <p:cNvSpPr>
+            <a:spLocks noGrp="1"/>
+          </p:cNvSpPr>
+          <p:nvPr>
+            <p:ph type="dt" sz="half" idx="10"/>
+          </p:nvPr>
+        </p:nvSpPr>
+        <p:spPr/>
+        <p:txBody>
+          <a:bodyPr/>
+          <a:lstStyle/>
+          <a:p>
+            <a:fld id="{EEF01910-E735-476D-980E-B979AA991A9A}" type="datetime1">
+              <a:rPr lang="de-DE" smtClean="0"/>
+              <a:pPr/>
+              <a:t>10.06.2015</a:t>
+            </a:fld>
+            <a:endParaRPr lang="en-US" dirty="0"/>
+          </a:p>
+        </p:txBody>
+      </p:sp>
+      <p:sp>
+        <p:nvSpPr>
+          <p:cNvPr id="8" name="Foliennummernplatzhalter 7"/>
+          <p:cNvSpPr>
+            <a:spLocks noGrp="1"/>
+          </p:cNvSpPr>
+          <p:nvPr>
+            <p:ph type="sldNum" sz="quarter" idx="12"/>
+          </p:nvPr>
+        </p:nvSpPr>
+        <p:spPr/>
+        <p:txBody>
+          <a:bodyPr/>
+          <a:lstStyle/>
+          <a:p>
+            <a:fld id="{4FAB73BC-B049-4115-A692-8D63A059BFB8}" type="slidenum">
+              <a:rPr lang="en-US" smtClean="0"/>
+              <a:pPr/>
+              <a:t>9</a:t>
+            </a:fld>
+            <a:endParaRPr lang="en-US" dirty="0"/>
+          </a:p>
+        </p:txBody>
+      </p:sp>
+      <p:sp>
+        <p:nvSpPr>
+          <p:cNvPr id="9" name="Fußzeilenplatzhalter 8"/>
           <p:cNvSpPr>
             <a:spLocks noGrp="1"/>
           </p:cNvSpPr>
@@ -6132,7 +6733,7 @@
   <a:extraClrSchemeLst/>
   <a:extLst>
     <a:ext uri="{05A4C25C-085E-4340-85A3-A5531E510DB2}">
-      <thm15:themeFamily xmlns:thm15="http://schemas.microsoft.com/office/thememl/2012/main" xmlns="" name="Retrospect" id="{5F128B03-DCCA-4EEB-AB3B-CF2899314A46}" vid="{9CC26709-368C-4D72-9060-94E5B3FF3CD6}"/>
+      <thm15:themeFamily xmlns="" xmlns:thm15="http://schemas.microsoft.com/office/thememl/2012/main" name="Retrospect" id="{5F128B03-DCCA-4EEB-AB3B-CF2899314A46}" vid="{9CC26709-368C-4D72-9060-94E5B3FF3CD6}"/>
     </a:ext>
   </a:extLst>
 </a:theme>
@@ -6393,7 +6994,7 @@
   <a:extraClrSchemeLst/>
   <a:extLst>
     <a:ext uri="{05A4C25C-085E-4340-85A3-A5531E510DB2}">
-      <thm15:themeFamily xmlns:thm15="http://schemas.microsoft.com/office/thememl/2012/main" xmlns="" name="Office Theme" id="{62F939B6-93AF-4DB8-9C6B-D6C7DFDC589F}" vid="{4A3C46E8-61CC-4603-A589-7422A47A8E4A}"/>
+      <thm15:themeFamily xmlns="" xmlns:thm15="http://schemas.microsoft.com/office/thememl/2012/main" name="Office Theme" id="{62F939B6-93AF-4DB8-9C6B-D6C7DFDC589F}" vid="{4A3C46E8-61CC-4603-A589-7422A47A8E4A}"/>
     </a:ext>
   </a:extLst>
 </a:theme>

</xml_diff>

<commit_message>
add new version of presentation
</commit_message>
<xml_diff>
--- a/de.htwg.se.mastermind/Presentation.pptx
+++ b/de.htwg.se.mastermind/Presentation.pptx
@@ -5,7 +5,7 @@
     <p:sldMasterId id="2147483910" r:id="rId1"/>
   </p:sldMasterIdLst>
   <p:notesMasterIdLst>
-    <p:notesMasterId r:id="rId15"/>
+    <p:notesMasterId r:id="rId16"/>
   </p:notesMasterIdLst>
   <p:sldIdLst>
     <p:sldId id="256" r:id="rId2"/>
@@ -20,7 +20,8 @@
     <p:sldId id="272" r:id="rId11"/>
     <p:sldId id="271" r:id="rId12"/>
     <p:sldId id="270" r:id="rId13"/>
-    <p:sldId id="259" r:id="rId14"/>
+    <p:sldId id="273" r:id="rId14"/>
+    <p:sldId id="259" r:id="rId15"/>
   </p:sldIdLst>
   <p:sldSz cx="9144000" cy="6858000" type="screen4x3"/>
   <p:notesSz cx="6858000" cy="9144000"/>
@@ -221,7 +222,7 @@
             <a:fld id="{F54E8837-5039-41ED-B9BC-F738B3360D64}" type="datetimeFigureOut">
               <a:rPr lang="de-DE"/>
               <a:pPr/>
-              <a:t>17.06.2015</a:t>
+              <a:t>30.06.2015</a:t>
             </a:fld>
             <a:endParaRPr lang="de-DE"/>
           </a:p>
@@ -806,7 +807,7 @@
             <a:fld id="{0D4B5BC9-8E77-47C1-BB89-20F126E111F0}" type="datetime1">
               <a:rPr lang="de-DE" smtClean="0"/>
               <a:pPr/>
-              <a:t>17.06.2015</a:t>
+              <a:t>30.06.2015</a:t>
             </a:fld>
             <a:endParaRPr lang="en-US" dirty="0"/>
           </a:p>
@@ -1020,7 +1021,7 @@
             <a:fld id="{A2845164-0F48-4D58-B7D4-F4224632171D}" type="datetime1">
               <a:rPr lang="de-DE" smtClean="0"/>
               <a:pPr/>
-              <a:t>17.06.2015</a:t>
+              <a:t>30.06.2015</a:t>
             </a:fld>
             <a:endParaRPr lang="en-US" dirty="0"/>
           </a:p>
@@ -1282,7 +1283,7 @@
             <a:fld id="{8EF85F82-E37F-4540-9E40-2E79E2DC6ADE}" type="datetime1">
               <a:rPr lang="de-DE" smtClean="0"/>
               <a:pPr/>
-              <a:t>17.06.2015</a:t>
+              <a:t>30.06.2015</a:t>
             </a:fld>
             <a:endParaRPr lang="en-US" dirty="0"/>
           </a:p>
@@ -1411,7 +1412,7 @@
             <a:fld id="{2DDC997A-E1DE-4642-AA4B-BD3883EA8A23}" type="datetime1">
               <a:rPr lang="de-DE" smtClean="0"/>
               <a:pPr/>
-              <a:t>17.06.2015</a:t>
+              <a:t>30.06.2015</a:t>
             </a:fld>
             <a:endParaRPr lang="en-US" dirty="0"/>
           </a:p>
@@ -1902,7 +1903,7 @@
             <a:fld id="{141039BF-75AD-47B6-B2FE-BB857E5D9596}" type="datetime1">
               <a:rPr lang="de-DE" smtClean="0"/>
               <a:pPr/>
-              <a:t>17.06.2015</a:t>
+              <a:t>30.06.2015</a:t>
             </a:fld>
             <a:endParaRPr lang="en-US" dirty="0"/>
           </a:p>
@@ -2183,7 +2184,7 @@
             <a:fld id="{B15BAFC3-9A23-4666-959E-5E36FCD086E7}" type="datetime1">
               <a:rPr lang="de-DE" smtClean="0"/>
               <a:pPr/>
-              <a:t>17.06.2015</a:t>
+              <a:t>30.06.2015</a:t>
             </a:fld>
             <a:endParaRPr lang="en-US" dirty="0"/>
           </a:p>
@@ -2568,7 +2569,7 @@
             <a:fld id="{7B1B55BF-9CD9-4994-BA1F-02E2FBCEB918}" type="datetime1">
               <a:rPr lang="de-DE" smtClean="0"/>
               <a:pPr/>
-              <a:t>17.06.2015</a:t>
+              <a:t>30.06.2015</a:t>
             </a:fld>
             <a:endParaRPr lang="en-US" dirty="0"/>
           </a:p>
@@ -2692,7 +2693,7 @@
             <a:fld id="{62E82DC3-09E8-4BD8-8ECB-4DF739DA760C}" type="datetime1">
               <a:rPr lang="de-DE" smtClean="0"/>
               <a:pPr/>
-              <a:t>17.06.2015</a:t>
+              <a:t>30.06.2015</a:t>
             </a:fld>
             <a:endParaRPr lang="en-US" dirty="0"/>
           </a:p>
@@ -2869,7 +2870,7 @@
             <a:fld id="{C73792DA-8F94-40B7-AFAB-167201D2BB07}" type="datetime1">
               <a:rPr lang="de-DE" smtClean="0"/>
               <a:pPr/>
-              <a:t>17.06.2015</a:t>
+              <a:t>30.06.2015</a:t>
             </a:fld>
             <a:endParaRPr lang="en-US" dirty="0"/>
           </a:p>
@@ -3229,7 +3230,7 @@
             <a:fld id="{71D88CAB-D144-4121-B0BA-48F74F2AA981}" type="datetime1">
               <a:rPr lang="de-DE" smtClean="0"/>
               <a:pPr/>
-              <a:t>17.06.2015</a:t>
+              <a:t>30.06.2015</a:t>
             </a:fld>
             <a:endParaRPr lang="en-US" dirty="0"/>
           </a:p>
@@ -3612,7 +3613,7 @@
             <a:fld id="{E19CC5BD-B0D2-499F-8B44-F84F9D4B93DC}" type="datetime1">
               <a:rPr lang="de-DE" smtClean="0"/>
               <a:pPr/>
-              <a:t>17.06.2015</a:t>
+              <a:t>30.06.2015</a:t>
             </a:fld>
             <a:endParaRPr lang="en-US" dirty="0"/>
           </a:p>
@@ -3905,7 +3906,7 @@
             <a:fld id="{87470D16-1792-4024-B1D2-A0A5F9C1C36F}" type="datetime1">
               <a:rPr lang="de-DE" smtClean="0"/>
               <a:pPr/>
-              <a:t>17.06.2015</a:t>
+              <a:t>30.06.2015</a:t>
             </a:fld>
             <a:endParaRPr lang="en-US" dirty="0"/>
           </a:p>
@@ -4613,7 +4614,7 @@
             <a:fld id="{EEF01910-E735-476D-980E-B979AA991A9A}" type="datetime1">
               <a:rPr lang="de-DE" smtClean="0"/>
               <a:pPr/>
-              <a:t>17.06.2015</a:t>
+              <a:t>30.06.2015</a:t>
             </a:fld>
             <a:endParaRPr lang="en-US" dirty="0"/>
           </a:p>
@@ -4821,7 +4822,7 @@
             <a:fld id="{EEF01910-E735-476D-980E-B979AA991A9A}" type="datetime1">
               <a:rPr lang="de-DE" smtClean="0"/>
               <a:pPr/>
-              <a:t>17.06.2015</a:t>
+              <a:t>30.06.2015</a:t>
             </a:fld>
             <a:endParaRPr lang="en-US" dirty="0"/>
           </a:p>
@@ -5029,7 +5030,7 @@
             <a:fld id="{EEF01910-E735-476D-980E-B979AA991A9A}" type="datetime1">
               <a:rPr lang="de-DE" smtClean="0"/>
               <a:pPr/>
-              <a:t>17.06.2015</a:t>
+              <a:t>30.06.2015</a:t>
             </a:fld>
             <a:endParaRPr lang="en-US" dirty="0"/>
           </a:p>
@@ -5351,59 +5352,53 @@
             <p:ph type="title"/>
           </p:nvPr>
         </p:nvSpPr>
+        <p:spPr>
+          <a:xfrm>
+            <a:off x="822959" y="286604"/>
+            <a:ext cx="6128031" cy="865921"/>
+          </a:xfrm>
+        </p:spPr>
+        <p:txBody>
+          <a:bodyPr>
+            <a:normAutofit fontScale="90000"/>
+          </a:bodyPr>
+          <a:lstStyle/>
+          <a:p>
+            <a:r>
+              <a:rPr lang="de-DE" b="1" dirty="0" smtClean="0"/>
+              <a:t>Lastetest WUI (mit </a:t>
+            </a:r>
+            <a:r>
+              <a:rPr lang="de-DE" b="1" dirty="0" err="1" smtClean="0"/>
+              <a:t>JMeter</a:t>
+            </a:r>
+            <a:r>
+              <a:rPr lang="de-DE" b="1" dirty="0" smtClean="0"/>
+              <a:t>)</a:t>
+            </a:r>
+            <a:endParaRPr lang="de-DE" b="1" dirty="0"/>
+          </a:p>
+        </p:txBody>
+      </p:sp>
+      <p:sp>
+        <p:nvSpPr>
+          <p:cNvPr id="7" name="Datumsplatzhalter 6"/>
+          <p:cNvSpPr>
+            <a:spLocks noGrp="1"/>
+          </p:cNvSpPr>
+          <p:nvPr>
+            <p:ph type="dt" sz="half" idx="10"/>
+          </p:nvPr>
+        </p:nvSpPr>
         <p:spPr/>
         <p:txBody>
-          <a:bodyPr>
-            <a:normAutofit/>
-          </a:bodyPr>
-          <a:lstStyle/>
-          <a:p>
-            <a:r>
-              <a:rPr lang="de-DE" sz="5400" b="1" dirty="0" smtClean="0"/>
-              <a:t>Vielen Dank für Ihre Aufmerksamkeit</a:t>
-            </a:r>
-            <a:endParaRPr lang="de-DE" sz="5400" b="1" dirty="0"/>
-          </a:p>
-        </p:txBody>
-      </p:sp>
-      <p:sp>
-        <p:nvSpPr>
-          <p:cNvPr id="3" name="Textplatzhalter 2"/>
-          <p:cNvSpPr>
-            <a:spLocks noGrp="1"/>
-          </p:cNvSpPr>
-          <p:nvPr>
-            <p:ph type="body" idx="1"/>
-          </p:nvPr>
-        </p:nvSpPr>
-        <p:spPr/>
-        <p:txBody>
-          <a:bodyPr/>
-          <a:lstStyle/>
-          <a:p>
-            <a:endParaRPr lang="de-DE" dirty="0"/>
-          </a:p>
-        </p:txBody>
-      </p:sp>
-      <p:sp>
-        <p:nvSpPr>
-          <p:cNvPr id="5" name="Datumsplatzhalter 4"/>
-          <p:cNvSpPr>
-            <a:spLocks noGrp="1"/>
-          </p:cNvSpPr>
-          <p:nvPr>
-            <p:ph type="dt" sz="half" idx="10"/>
-          </p:nvPr>
-        </p:nvSpPr>
-        <p:spPr/>
-        <p:txBody>
-          <a:bodyPr/>
-          <a:lstStyle/>
-          <a:p>
-            <a:fld id="{14D1886A-1E1A-4BBA-8E28-CE7DA8C564DE}" type="datetime1">
+          <a:bodyPr/>
+          <a:lstStyle/>
+          <a:p>
+            <a:fld id="{EEF01910-E735-476D-980E-B979AA991A9A}" type="datetime1">
               <a:rPr lang="de-DE" smtClean="0"/>
               <a:pPr/>
-              <a:t>17.06.2015</a:t>
+              <a:t>30.06.2015</a:t>
             </a:fld>
             <a:endParaRPr lang="en-US" dirty="0"/>
           </a:p>
@@ -5411,7 +5406,7 @@
       </p:sp>
       <p:sp>
         <p:nvSpPr>
-          <p:cNvPr id="6" name="Foliennummernplatzhalter 5"/>
+          <p:cNvPr id="8" name="Foliennummernplatzhalter 7"/>
           <p:cNvSpPr>
             <a:spLocks noGrp="1"/>
           </p:cNvSpPr>
@@ -5428,6 +5423,218 @@
               <a:rPr lang="en-US" smtClean="0"/>
               <a:pPr/>
               <a:t>13</a:t>
+            </a:fld>
+            <a:endParaRPr lang="en-US" dirty="0"/>
+          </a:p>
+        </p:txBody>
+      </p:sp>
+      <p:sp>
+        <p:nvSpPr>
+          <p:cNvPr id="9" name="Fußzeilenplatzhalter 8"/>
+          <p:cNvSpPr>
+            <a:spLocks noGrp="1"/>
+          </p:cNvSpPr>
+          <p:nvPr>
+            <p:ph type="ftr" sz="quarter" idx="11"/>
+          </p:nvPr>
+        </p:nvSpPr>
+        <p:spPr/>
+        <p:txBody>
+          <a:bodyPr/>
+          <a:lstStyle/>
+          <a:p>
+            <a:r>
+              <a:rPr lang="en-US" smtClean="0"/>
+              <a:t>Software Architektur Präsentation - SS2015</a:t>
+            </a:r>
+            <a:endParaRPr lang="en-US" dirty="0"/>
+          </a:p>
+        </p:txBody>
+      </p:sp>
+      <p:pic>
+        <p:nvPicPr>
+          <p:cNvPr id="3" name="Grafik 2"/>
+          <p:cNvPicPr>
+            <a:picLocks noChangeAspect="1"/>
+          </p:cNvPicPr>
+          <p:nvPr/>
+        </p:nvPicPr>
+        <p:blipFill>
+          <a:blip r:embed="rId2">
+            <a:extLst>
+              <a:ext uri="{28A0092B-C50C-407E-A947-70E740481C1C}">
+                <a14:useLocalDpi xmlns:a14="http://schemas.microsoft.com/office/drawing/2010/main" val="0"/>
+              </a:ext>
+            </a:extLst>
+          </a:blip>
+          <a:stretch>
+            <a:fillRect/>
+          </a:stretch>
+        </p:blipFill>
+        <p:spPr>
+          <a:xfrm>
+            <a:off x="667265" y="1224412"/>
+            <a:ext cx="6601563" cy="1386983"/>
+          </a:xfrm>
+          <a:prstGeom prst="rect">
+            <a:avLst/>
+          </a:prstGeom>
+        </p:spPr>
+      </p:pic>
+      <p:pic>
+        <p:nvPicPr>
+          <p:cNvPr id="4" name="Grafik 3"/>
+          <p:cNvPicPr>
+            <a:picLocks noChangeAspect="1"/>
+          </p:cNvPicPr>
+          <p:nvPr/>
+        </p:nvPicPr>
+        <p:blipFill>
+          <a:blip r:embed="rId3">
+            <a:extLst>
+              <a:ext uri="{28A0092B-C50C-407E-A947-70E740481C1C}">
+                <a14:useLocalDpi xmlns:a14="http://schemas.microsoft.com/office/drawing/2010/main" val="0"/>
+              </a:ext>
+            </a:extLst>
+          </a:blip>
+          <a:stretch>
+            <a:fillRect/>
+          </a:stretch>
+        </p:blipFill>
+        <p:spPr>
+          <a:xfrm>
+            <a:off x="1054225" y="2683282"/>
+            <a:ext cx="5896765" cy="3584923"/>
+          </a:xfrm>
+          <a:prstGeom prst="rect">
+            <a:avLst/>
+          </a:prstGeom>
+        </p:spPr>
+      </p:pic>
+    </p:spTree>
+    <p:extLst>
+      <p:ext uri="{BB962C8B-B14F-4D97-AF65-F5344CB8AC3E}">
+        <p14:creationId xmlns:p14="http://schemas.microsoft.com/office/powerpoint/2010/main" val="1385582777"/>
+      </p:ext>
+    </p:extLst>
+  </p:cSld>
+  <p:clrMapOvr>
+    <a:masterClrMapping/>
+  </p:clrMapOvr>
+  <p:timing>
+    <p:tnLst>
+      <p:par>
+        <p:cTn id="1" dur="indefinite" restart="never" nodeType="tmRoot"/>
+      </p:par>
+    </p:tnLst>
+  </p:timing>
+</p:sld>
+</file>
+
+<file path=ppt/slides/slide14.xml><?xml version="1.0" encoding="utf-8"?>
+<p:sld xmlns:a="http://schemas.openxmlformats.org/drawingml/2006/main" xmlns:r="http://schemas.openxmlformats.org/officeDocument/2006/relationships" xmlns:p="http://schemas.openxmlformats.org/presentationml/2006/main">
+  <p:cSld>
+    <p:spTree>
+      <p:nvGrpSpPr>
+        <p:cNvPr id="1" name=""/>
+        <p:cNvGrpSpPr/>
+        <p:nvPr/>
+      </p:nvGrpSpPr>
+      <p:grpSpPr>
+        <a:xfrm>
+          <a:off x="0" y="0"/>
+          <a:ext cx="0" cy="0"/>
+          <a:chOff x="0" y="0"/>
+          <a:chExt cx="0" cy="0"/>
+        </a:xfrm>
+      </p:grpSpPr>
+      <p:sp>
+        <p:nvSpPr>
+          <p:cNvPr id="2" name="Titel 1"/>
+          <p:cNvSpPr>
+            <a:spLocks noGrp="1"/>
+          </p:cNvSpPr>
+          <p:nvPr>
+            <p:ph type="title"/>
+          </p:nvPr>
+        </p:nvSpPr>
+        <p:spPr/>
+        <p:txBody>
+          <a:bodyPr>
+            <a:normAutofit/>
+          </a:bodyPr>
+          <a:lstStyle/>
+          <a:p>
+            <a:r>
+              <a:rPr lang="de-DE" sz="5400" b="1" dirty="0" smtClean="0"/>
+              <a:t>Vielen Dank für Ihre Aufmerksamkeit</a:t>
+            </a:r>
+            <a:endParaRPr lang="de-DE" sz="5400" b="1" dirty="0"/>
+          </a:p>
+        </p:txBody>
+      </p:sp>
+      <p:sp>
+        <p:nvSpPr>
+          <p:cNvPr id="3" name="Textplatzhalter 2"/>
+          <p:cNvSpPr>
+            <a:spLocks noGrp="1"/>
+          </p:cNvSpPr>
+          <p:nvPr>
+            <p:ph type="body" idx="1"/>
+          </p:nvPr>
+        </p:nvSpPr>
+        <p:spPr/>
+        <p:txBody>
+          <a:bodyPr/>
+          <a:lstStyle/>
+          <a:p>
+            <a:endParaRPr lang="de-DE" dirty="0"/>
+          </a:p>
+        </p:txBody>
+      </p:sp>
+      <p:sp>
+        <p:nvSpPr>
+          <p:cNvPr id="5" name="Datumsplatzhalter 4"/>
+          <p:cNvSpPr>
+            <a:spLocks noGrp="1"/>
+          </p:cNvSpPr>
+          <p:nvPr>
+            <p:ph type="dt" sz="half" idx="10"/>
+          </p:nvPr>
+        </p:nvSpPr>
+        <p:spPr/>
+        <p:txBody>
+          <a:bodyPr/>
+          <a:lstStyle/>
+          <a:p>
+            <a:fld id="{14D1886A-1E1A-4BBA-8E28-CE7DA8C564DE}" type="datetime1">
+              <a:rPr lang="de-DE" smtClean="0"/>
+              <a:pPr/>
+              <a:t>30.06.2015</a:t>
+            </a:fld>
+            <a:endParaRPr lang="en-US" dirty="0"/>
+          </a:p>
+        </p:txBody>
+      </p:sp>
+      <p:sp>
+        <p:nvSpPr>
+          <p:cNvPr id="6" name="Foliennummernplatzhalter 5"/>
+          <p:cNvSpPr>
+            <a:spLocks noGrp="1"/>
+          </p:cNvSpPr>
+          <p:nvPr>
+            <p:ph type="sldNum" sz="quarter" idx="12"/>
+          </p:nvPr>
+        </p:nvSpPr>
+        <p:spPr/>
+        <p:txBody>
+          <a:bodyPr/>
+          <a:lstStyle/>
+          <a:p>
+            <a:fld id="{4FAB73BC-B049-4115-A692-8D63A059BFB8}" type="slidenum">
+              <a:rPr lang="en-US" smtClean="0"/>
+              <a:pPr/>
+              <a:t>14</a:t>
             </a:fld>
             <a:endParaRPr lang="en-US" dirty="0"/>
           </a:p>
@@ -5529,7 +5736,7 @@
         </p:spPr>
         <p:txBody>
           <a:bodyPr>
-            <a:normAutofit lnSpcReduction="10000"/>
+            <a:normAutofit fontScale="92500" lnSpcReduction="10000"/>
           </a:bodyPr>
           <a:lstStyle/>
           <a:p>
@@ -5568,7 +5775,7 @@
             </a:pPr>
             <a:r>
               <a:rPr lang="de-DE" sz="2000" dirty="0" smtClean="0"/>
-              <a:t>Metriken</a:t>
+              <a:t>Architektur</a:t>
             </a:r>
           </a:p>
           <a:p>
@@ -5581,6 +5788,20 @@
             </a:pPr>
             <a:r>
               <a:rPr lang="de-DE" sz="2000" dirty="0" smtClean="0"/>
+              <a:t>Metriken</a:t>
+            </a:r>
+            <a:endParaRPr lang="de-DE" sz="2000" dirty="0" smtClean="0"/>
+          </a:p>
+          <a:p>
+            <a:pPr marL="1022985" lvl="3" indent="-457200">
+              <a:lnSpc>
+                <a:spcPct val="150000"/>
+              </a:lnSpc>
+              <a:buFont typeface="Courier New" panose="02070309020205020404" pitchFamily="49" charset="0"/>
+              <a:buChar char="o"/>
+            </a:pPr>
+            <a:r>
+              <a:rPr lang="de-DE" sz="2000" dirty="0" smtClean="0"/>
               <a:t>Views</a:t>
             </a:r>
           </a:p>
@@ -5660,7 +5881,7 @@
             <a:fld id="{63BA7107-135F-4272-B660-DC5C627C7572}" type="datetime1">
               <a:rPr lang="de-DE" smtClean="0"/>
               <a:pPr/>
-              <a:t>17.06.2015</a:t>
+              <a:t>30.06.2015</a:t>
             </a:fld>
             <a:endParaRPr lang="en-US" dirty="0"/>
           </a:p>
@@ -5893,7 +6114,7 @@
             <a:fld id="{5BBF3383-53D5-432D-AF13-3F33FADF3634}" type="datetime1">
               <a:rPr lang="de-DE" smtClean="0"/>
               <a:pPr/>
-              <a:t>17.06.2015</a:t>
+              <a:t>30.06.2015</a:t>
             </a:fld>
             <a:endParaRPr lang="en-US" dirty="0"/>
           </a:p>
@@ -6019,12 +6240,12 @@
         <p:spPr>
           <a:xfrm>
             <a:off x="822960" y="1407584"/>
-            <a:ext cx="5082540" cy="4431080"/>
+            <a:ext cx="5082540" cy="4245100"/>
           </a:xfrm>
         </p:spPr>
         <p:txBody>
           <a:bodyPr>
-            <a:normAutofit/>
+            <a:normAutofit fontScale="77500" lnSpcReduction="20000"/>
           </a:bodyPr>
           <a:lstStyle/>
           <a:p>
@@ -6037,7 +6258,7 @@
             </a:pPr>
             <a:r>
               <a:rPr lang="de-DE" sz="3200" dirty="0" smtClean="0"/>
-              <a:t>Farbkombination erraten</a:t>
+              <a:t>7 verschiedene Farben</a:t>
             </a:r>
           </a:p>
           <a:p>
@@ -6050,8 +6271,71 @@
             </a:pPr>
             <a:r>
               <a:rPr lang="de-DE" sz="3200" dirty="0" smtClean="0"/>
-              <a:t>Mit Lösungs-Hinweisen</a:t>
-            </a:r>
+              <a:t>Computer wählt 4 davon aus</a:t>
+            </a:r>
+            <a:endParaRPr lang="de-DE" sz="3200" dirty="0" smtClean="0"/>
+          </a:p>
+          <a:p>
+            <a:pPr marL="534988" lvl="1" indent="-334963">
+              <a:lnSpc>
+                <a:spcPct val="200000"/>
+              </a:lnSpc>
+              <a:buFont typeface="Arial" pitchFamily="34" charset="0"/>
+              <a:buChar char="•"/>
+            </a:pPr>
+            <a:r>
+              <a:rPr lang="de-DE" sz="3200" dirty="0" smtClean="0"/>
+              <a:t>Ziel: Farbkombination erraten</a:t>
+            </a:r>
+            <a:endParaRPr lang="de-DE" sz="3200" dirty="0" smtClean="0"/>
+          </a:p>
+          <a:p>
+            <a:pPr marL="534988" lvl="1" indent="-334963">
+              <a:lnSpc>
+                <a:spcPct val="200000"/>
+              </a:lnSpc>
+              <a:buFont typeface="Arial" pitchFamily="34" charset="0"/>
+              <a:buChar char="•"/>
+            </a:pPr>
+            <a:r>
+              <a:rPr lang="de-DE" sz="3200" dirty="0" smtClean="0"/>
+              <a:t>Mit </a:t>
+            </a:r>
+            <a:r>
+              <a:rPr lang="de-DE" sz="3200" dirty="0" smtClean="0"/>
+              <a:t>Lösungs-Hinweisen</a:t>
+            </a:r>
+          </a:p>
+          <a:p>
+            <a:pPr marL="542925" lvl="1" indent="-342900">
+              <a:lnSpc>
+                <a:spcPct val="200000"/>
+              </a:lnSpc>
+              <a:buFontTx/>
+              <a:buChar char="-"/>
+            </a:pPr>
+            <a:r>
+              <a:rPr lang="de-DE" sz="1900" dirty="0" smtClean="0"/>
+              <a:t>Weiß: Richtige Farbe an falscher Position</a:t>
+            </a:r>
+          </a:p>
+          <a:p>
+            <a:pPr marL="542925" lvl="1" indent="-342900">
+              <a:lnSpc>
+                <a:spcPct val="200000"/>
+              </a:lnSpc>
+              <a:buFontTx/>
+              <a:buChar char="-"/>
+            </a:pPr>
+            <a:r>
+              <a:rPr lang="de-DE" sz="1900" dirty="0" smtClean="0"/>
+              <a:t>Schwarz: Richtige Farbe an richtiger Position</a:t>
+            </a:r>
+            <a:r>
+              <a:rPr lang="de-DE" sz="1900" dirty="0" smtClean="0"/>
+              <a:t> </a:t>
+            </a:r>
+            <a:endParaRPr lang="de-DE" sz="1900" dirty="0" smtClean="0"/>
           </a:p>
           <a:p>
             <a:pPr lvl="1">
@@ -6118,7 +6402,7 @@
             <a:fld id="{D8E9E448-2B95-4BAB-A070-BBA0EF87464D}" type="datetime1">
               <a:rPr lang="de-DE" smtClean="0"/>
               <a:pPr/>
-              <a:t>17.06.2015</a:t>
+              <a:t>30.06.2015</a:t>
             </a:fld>
             <a:endParaRPr lang="en-US" dirty="0"/>
           </a:p>
@@ -6281,7 +6565,7 @@
             <a:fld id="{EEF01910-E735-476D-980E-B979AA991A9A}" type="datetime1">
               <a:rPr lang="de-DE" smtClean="0"/>
               <a:pPr/>
-              <a:t>17.06.2015</a:t>
+              <a:t>30.06.2015</a:t>
             </a:fld>
             <a:endParaRPr lang="en-US" dirty="0"/>
           </a:p>
@@ -6371,37 +6655,26 @@
       </p:pic>
       <p:pic>
         <p:nvPicPr>
-          <p:cNvPr id="10" name="Picture 2"/>
+          <p:cNvPr id="3" name="Grafik 2"/>
           <p:cNvPicPr>
-            <a:picLocks noChangeAspect="1" noChangeArrowheads="1"/>
+            <a:picLocks noChangeAspect="1"/>
           </p:cNvPicPr>
           <p:nvPr/>
         </p:nvPicPr>
         <p:blipFill>
           <a:blip r:embed="rId4"/>
-          <a:srcRect/>
           <a:stretch>
             <a:fillRect/>
           </a:stretch>
         </p:blipFill>
-        <p:spPr bwMode="auto">
-          <a:xfrm>
-            <a:off x="906707" y="1295381"/>
-            <a:ext cx="4039255" cy="2455429"/>
+        <p:spPr>
+          <a:xfrm>
+            <a:off x="581364" y="1189748"/>
+            <a:ext cx="4366550" cy="2682076"/>
           </a:xfrm>
           <a:prstGeom prst="rect">
             <a:avLst/>
           </a:prstGeom>
-          <a:ln>
-            <a:noFill/>
-          </a:ln>
-          <a:effectLst>
-            <a:outerShdw blurRad="292100" dist="139700" dir="2700000" algn="tl" rotWithShape="0">
-              <a:srgbClr val="333333">
-                <a:alpha val="65000"/>
-              </a:srgbClr>
-            </a:outerShdw>
-          </a:effectLst>
         </p:spPr>
       </p:pic>
     </p:spTree>
@@ -6482,7 +6755,7 @@
             <a:fld id="{EEF01910-E735-476D-980E-B979AA991A9A}" type="datetime1">
               <a:rPr lang="de-DE" smtClean="0"/>
               <a:pPr/>
-              <a:t>17.06.2015</a:t>
+              <a:t>30.06.2015</a:t>
             </a:fld>
             <a:endParaRPr lang="en-US" dirty="0"/>
           </a:p>
@@ -6537,21 +6810,22 @@
       </p:sp>
       <p:pic>
         <p:nvPicPr>
-          <p:cNvPr id="4" name="Grafik 3"/>
+          <p:cNvPr id="3" name="Grafik 2"/>
           <p:cNvPicPr>
             <a:picLocks noChangeAspect="1"/>
           </p:cNvPicPr>
           <p:nvPr/>
         </p:nvPicPr>
-        <p:blipFill rotWithShape="1">
+        <p:blipFill>
           <a:blip r:embed="rId2"/>
-          <a:srcRect l="53846" r="6934" b="8272"/>
-          <a:stretch/>
+          <a:stretch>
+            <a:fillRect/>
+          </a:stretch>
         </p:blipFill>
         <p:spPr>
           <a:xfrm>
-            <a:off x="629288" y="1403985"/>
-            <a:ext cx="3917998" cy="4640541"/>
+            <a:off x="4851914" y="4503351"/>
+            <a:ext cx="3724938" cy="1541175"/>
           </a:xfrm>
           <a:prstGeom prst="rect">
             <a:avLst/>
@@ -6570,40 +6844,7 @@
       </p:pic>
       <p:pic>
         <p:nvPicPr>
-          <p:cNvPr id="11" name="Grafik 10"/>
-          <p:cNvPicPr>
-            <a:picLocks noChangeAspect="1"/>
-          </p:cNvPicPr>
-          <p:nvPr/>
-        </p:nvPicPr>
-        <p:blipFill rotWithShape="1">
-          <a:blip r:embed="rId2"/>
-          <a:srcRect l="7367" r="58397" b="55895"/>
-          <a:stretch/>
-        </p:blipFill>
-        <p:spPr>
-          <a:xfrm>
-            <a:off x="4838700" y="1394460"/>
-            <a:ext cx="3738152" cy="2629789"/>
-          </a:xfrm>
-          <a:prstGeom prst="rect">
-            <a:avLst/>
-          </a:prstGeom>
-          <a:ln>
-            <a:noFill/>
-          </a:ln>
-          <a:effectLst>
-            <a:outerShdw blurRad="292100" dist="139700" dir="2700000" algn="tl" rotWithShape="0">
-              <a:srgbClr val="333333">
-                <a:alpha val="65000"/>
-              </a:srgbClr>
-            </a:outerShdw>
-          </a:effectLst>
-        </p:spPr>
-      </p:pic>
-      <p:pic>
-        <p:nvPicPr>
-          <p:cNvPr id="3" name="Grafik 2"/>
+          <p:cNvPr id="5" name="Grafik 4"/>
           <p:cNvPicPr>
             <a:picLocks noChangeAspect="1"/>
           </p:cNvPicPr>
@@ -6617,22 +6858,36 @@
         </p:blipFill>
         <p:spPr>
           <a:xfrm>
-            <a:off x="4851914" y="4503351"/>
-            <a:ext cx="3724938" cy="1541175"/>
+            <a:off x="386751" y="1394460"/>
+            <a:ext cx="4287627" cy="4421454"/>
           </a:xfrm>
           <a:prstGeom prst="rect">
             <a:avLst/>
           </a:prstGeom>
-          <a:ln>
-            <a:noFill/>
-          </a:ln>
-          <a:effectLst>
-            <a:outerShdw blurRad="292100" dist="139700" dir="2700000" algn="tl" rotWithShape="0">
-              <a:srgbClr val="333333">
-                <a:alpha val="65000"/>
-              </a:srgbClr>
-            </a:outerShdw>
-          </a:effectLst>
+        </p:spPr>
+      </p:pic>
+      <p:pic>
+        <p:nvPicPr>
+          <p:cNvPr id="6" name="Grafik 5"/>
+          <p:cNvPicPr>
+            <a:picLocks noChangeAspect="1"/>
+          </p:cNvPicPr>
+          <p:nvPr/>
+        </p:nvPicPr>
+        <p:blipFill>
+          <a:blip r:embed="rId4"/>
+          <a:stretch>
+            <a:fillRect/>
+          </a:stretch>
+        </p:blipFill>
+        <p:spPr>
+          <a:xfrm>
+            <a:off x="4674378" y="1330973"/>
+            <a:ext cx="4127414" cy="2528506"/>
+          </a:xfrm>
+          <a:prstGeom prst="rect">
+            <a:avLst/>
+          </a:prstGeom>
         </p:spPr>
       </p:pic>
     </p:spTree>
@@ -6718,7 +6973,7 @@
             <a:fld id="{EEF01910-E735-476D-980E-B979AA991A9A}" type="datetime1">
               <a:rPr lang="de-DE" smtClean="0"/>
               <a:pPr/>
-              <a:t>17.06.2015</a:t>
+              <a:t>30.06.2015</a:t>
             </a:fld>
             <a:endParaRPr lang="en-US" dirty="0"/>
           </a:p>
@@ -6954,7 +7209,7 @@
             <a:fld id="{EEF01910-E735-476D-980E-B979AA991A9A}" type="datetime1">
               <a:rPr lang="de-DE" smtClean="0"/>
               <a:pPr/>
-              <a:t>17.06.2015</a:t>
+              <a:t>30.06.2015</a:t>
             </a:fld>
             <a:endParaRPr lang="en-US" dirty="0"/>
           </a:p>
@@ -7223,7 +7478,7 @@
             <a:fld id="{EEF01910-E735-476D-980E-B979AA991A9A}" type="datetime1">
               <a:rPr lang="de-DE" smtClean="0"/>
               <a:pPr/>
-              <a:t>17.06.2015</a:t>
+              <a:t>30.06.2015</a:t>
             </a:fld>
             <a:endParaRPr lang="en-US" dirty="0"/>
           </a:p>

</xml_diff>